<commit_message>
Update 新增 Microsoft PowerPoint 簡報.pptx
</commit_message>
<xml_diff>
--- a/Python/新增 Microsoft PowerPoint 簡報.pptx
+++ b/Python/新增 Microsoft PowerPoint 簡報.pptx
@@ -4653,14 +4653,66 @@
         </p:blipFill>
         <p:spPr>
           <a:xfrm>
-            <a:off x="0" y="1458000"/>
-            <a:ext cx="9893130" cy="5400000"/>
+            <a:off x="0" y="2178000"/>
+            <a:ext cx="8574046" cy="4680000"/>
           </a:xfrm>
           <a:prstGeom prst="rect">
             <a:avLst/>
           </a:prstGeom>
         </p:spPr>
       </p:pic>
+      <p:sp>
+        <p:nvSpPr>
+          <p:cNvPr id="5" name="文字方塊 4">
+            <a:extLst>
+              <a:ext uri="{FF2B5EF4-FFF2-40B4-BE49-F238E27FC236}">
+                <a16:creationId xmlns:a16="http://schemas.microsoft.com/office/drawing/2014/main" id="{54B3366E-57F2-460E-1F1E-5B4A3E83CD5D}"/>
+              </a:ext>
+            </a:extLst>
+          </p:cNvPr>
+          <p:cNvSpPr txBox="1"/>
+          <p:nvPr/>
+        </p:nvSpPr>
+        <p:spPr>
+          <a:xfrm>
+            <a:off x="8574046" y="2178000"/>
+            <a:ext cx="2809102" cy="369332"/>
+          </a:xfrm>
+          <a:prstGeom prst="rect">
+            <a:avLst/>
+          </a:prstGeom>
+          <a:noFill/>
+        </p:spPr>
+        <p:txBody>
+          <a:bodyPr wrap="none" rtlCol="0">
+            <a:spAutoFit/>
+          </a:bodyPr>
+          <a:lstStyle/>
+          <a:p>
+            <a:r>
+              <a:rPr lang="zh-TW" altLang="en-US" dirty="0"/>
+              <a:t>開啟</a:t>
+            </a:r>
+            <a:r>
+              <a:rPr lang="en-US" altLang="zh-TW" dirty="0"/>
+              <a:t>VS Code</a:t>
+            </a:r>
+            <a:r>
+              <a:rPr lang="zh-TW" altLang="en-US" dirty="0"/>
+              <a:t>與</a:t>
+            </a:r>
+            <a:r>
+              <a:rPr lang="en-US" altLang="zh-TW" dirty="0"/>
+              <a:t>Prompt</a:t>
+            </a:r>
+            <a:r>
+              <a:rPr lang="zh-TW" altLang="en-US" dirty="0"/>
+              <a:t>備用</a:t>
+            </a:r>
+            <a:endParaRPr lang="en-US" altLang="zh-TW" dirty="0"/>
+          </a:p>
+        </p:txBody>
+      </p:sp>
     </p:spTree>
     <p:extLst>
       <p:ext uri="{BB962C8B-B14F-4D97-AF65-F5344CB8AC3E}">
@@ -4712,31 +4764,142 @@
           <a:bodyPr/>
           <a:lstStyle/>
           <a:p>
-            <a:endParaRPr lang="zh-TW" altLang="en-US"/>
-          </a:p>
-        </p:txBody>
-      </p:sp>
-      <p:sp>
-        <p:nvSpPr>
-          <p:cNvPr id="3" name="內容版面配置區 2">
-            <a:extLst>
-              <a:ext uri="{FF2B5EF4-FFF2-40B4-BE49-F238E27FC236}">
-                <a16:creationId xmlns:a16="http://schemas.microsoft.com/office/drawing/2014/main" id="{6CBFACFD-5424-8C92-C531-210BA1F8AC46}"/>
-              </a:ext>
-            </a:extLst>
-          </p:cNvPr>
-          <p:cNvSpPr>
-            <a:spLocks noGrp="1"/>
-          </p:cNvSpPr>
+            <a:r>
+              <a:rPr lang="zh-TW" altLang="en-US" dirty="0"/>
+              <a:t>環境建置</a:t>
+            </a:r>
+            <a:r>
+              <a:rPr lang="en-US" altLang="zh-TW" dirty="0"/>
+              <a:t>5</a:t>
+            </a:r>
+            <a:endParaRPr lang="zh-TW" altLang="en-US" dirty="0"/>
+          </a:p>
+        </p:txBody>
+      </p:sp>
+      <p:pic>
+        <p:nvPicPr>
+          <p:cNvPr id="5" name="內容版面配置區 4">
+            <a:extLst>
+              <a:ext uri="{FF2B5EF4-FFF2-40B4-BE49-F238E27FC236}">
+                <a16:creationId xmlns:a16="http://schemas.microsoft.com/office/drawing/2014/main" id="{4E90E745-A462-4D53-0F8E-FFB8269932E1}"/>
+              </a:ext>
+            </a:extLst>
+          </p:cNvPr>
+          <p:cNvPicPr>
+            <a:picLocks noGrp="1" noChangeAspect="1"/>
+          </p:cNvPicPr>
           <p:nvPr>
             <p:ph idx="1"/>
           </p:nvPr>
-        </p:nvSpPr>
-        <p:spPr/>
-        <p:txBody>
-          <a:bodyPr/>
-          <a:lstStyle/>
-          <a:p>
+        </p:nvPicPr>
+        <p:blipFill>
+          <a:blip r:embed="rId2"/>
+          <a:stretch>
+            <a:fillRect/>
+          </a:stretch>
+        </p:blipFill>
+        <p:spPr>
+          <a:xfrm>
+            <a:off x="0" y="2178000"/>
+            <a:ext cx="8574045" cy="4680000"/>
+          </a:xfrm>
+        </p:spPr>
+      </p:pic>
+      <p:sp>
+        <p:nvSpPr>
+          <p:cNvPr id="7" name="文字方塊 6">
+            <a:extLst>
+              <a:ext uri="{FF2B5EF4-FFF2-40B4-BE49-F238E27FC236}">
+                <a16:creationId xmlns:a16="http://schemas.microsoft.com/office/drawing/2014/main" id="{59BE9C40-9101-F78E-56EB-1DB235B34892}"/>
+              </a:ext>
+            </a:extLst>
+          </p:cNvPr>
+          <p:cNvSpPr txBox="1"/>
+          <p:nvPr/>
+        </p:nvSpPr>
+        <p:spPr>
+          <a:xfrm>
+            <a:off x="8574045" y="2178000"/>
+            <a:ext cx="3712650" cy="369332"/>
+          </a:xfrm>
+          <a:prstGeom prst="rect">
+            <a:avLst/>
+          </a:prstGeom>
+          <a:noFill/>
+        </p:spPr>
+        <p:txBody>
+          <a:bodyPr wrap="square">
+            <a:spAutoFit/>
+          </a:bodyPr>
+          <a:lstStyle/>
+          <a:p>
+            <a:r>
+              <a:rPr lang="zh-TW" altLang="en-US" dirty="0"/>
+              <a:t>開啟</a:t>
+            </a:r>
+            <a:r>
+              <a:rPr lang="en-US" altLang="zh-TW" dirty="0"/>
+              <a:t>VS Code</a:t>
+            </a:r>
+            <a:r>
+              <a:rPr lang="zh-TW" altLang="en-US" dirty="0"/>
+              <a:t>確認右下角環境為</a:t>
+            </a:r>
+            <a:r>
+              <a:rPr lang="en-US" altLang="zh-TW" dirty="0"/>
+              <a:t>Sam</a:t>
+            </a:r>
+          </a:p>
+        </p:txBody>
+      </p:sp>
+      <p:sp>
+        <p:nvSpPr>
+          <p:cNvPr id="8" name="矩形 7">
+            <a:extLst>
+              <a:ext uri="{FF2B5EF4-FFF2-40B4-BE49-F238E27FC236}">
+                <a16:creationId xmlns:a16="http://schemas.microsoft.com/office/drawing/2014/main" id="{5E8EF1F6-9024-FB23-8201-7A6AB761D6A7}"/>
+              </a:ext>
+            </a:extLst>
+          </p:cNvPr>
+          <p:cNvSpPr/>
+          <p:nvPr/>
+        </p:nvSpPr>
+        <p:spPr>
+          <a:xfrm>
+            <a:off x="7901125" y="6715957"/>
+            <a:ext cx="672919" cy="133165"/>
+          </a:xfrm>
+          <a:prstGeom prst="rect">
+            <a:avLst/>
+          </a:prstGeom>
+          <a:noFill/>
+          <a:ln w="28575">
+            <a:solidFill>
+              <a:srgbClr val="FF0000"/>
+            </a:solidFill>
+          </a:ln>
+        </p:spPr>
+        <p:style>
+          <a:lnRef idx="2">
+            <a:schemeClr val="accent1">
+              <a:shade val="15000"/>
+            </a:schemeClr>
+          </a:lnRef>
+          <a:fillRef idx="1">
+            <a:schemeClr val="accent1"/>
+          </a:fillRef>
+          <a:effectRef idx="0">
+            <a:schemeClr val="accent1"/>
+          </a:effectRef>
+          <a:fontRef idx="minor">
+            <a:schemeClr val="lt1"/>
+          </a:fontRef>
+        </p:style>
+        <p:txBody>
+          <a:bodyPr rtlCol="0" anchor="ctr"/>
+          <a:lstStyle/>
+          <a:p>
+            <a:pPr algn="ctr"/>
             <a:endParaRPr lang="zh-TW" altLang="en-US"/>
           </a:p>
         </p:txBody>

</xml_diff>